<commit_message>
Update on Visualization Lab
</commit_message>
<xml_diff>
--- a/Lab/DataVisualization/PythonLabPlots.pptx
+++ b/Lab/DataVisualization/PythonLabPlots.pptx
@@ -252,7 +252,7 @@
           <a:p>
             <a:fld id="{2FB4730B-5D83-4DEE-A74C-D6644E055767}" type="datetimeFigureOut">
               <a:rPr lang="en-US" smtClean="0"/>
-              <a:t>9/12/2018</a:t>
+              <a:t>9/14/2018</a:t>
             </a:fld>
             <a:endParaRPr lang="en-US"/>
           </a:p>
@@ -422,7 +422,7 @@
           <a:p>
             <a:fld id="{2FB4730B-5D83-4DEE-A74C-D6644E055767}" type="datetimeFigureOut">
               <a:rPr lang="en-US" smtClean="0"/>
-              <a:t>9/12/2018</a:t>
+              <a:t>9/14/2018</a:t>
             </a:fld>
             <a:endParaRPr lang="en-US"/>
           </a:p>
@@ -602,7 +602,7 @@
           <a:p>
             <a:fld id="{2FB4730B-5D83-4DEE-A74C-D6644E055767}" type="datetimeFigureOut">
               <a:rPr lang="en-US" smtClean="0"/>
-              <a:t>9/12/2018</a:t>
+              <a:t>9/14/2018</a:t>
             </a:fld>
             <a:endParaRPr lang="en-US"/>
           </a:p>
@@ -772,7 +772,7 @@
           <a:p>
             <a:fld id="{2FB4730B-5D83-4DEE-A74C-D6644E055767}" type="datetimeFigureOut">
               <a:rPr lang="en-US" smtClean="0"/>
-              <a:t>9/12/2018</a:t>
+              <a:t>9/14/2018</a:t>
             </a:fld>
             <a:endParaRPr lang="en-US"/>
           </a:p>
@@ -1018,7 +1018,7 @@
           <a:p>
             <a:fld id="{2FB4730B-5D83-4DEE-A74C-D6644E055767}" type="datetimeFigureOut">
               <a:rPr lang="en-US" smtClean="0"/>
-              <a:t>9/12/2018</a:t>
+              <a:t>9/14/2018</a:t>
             </a:fld>
             <a:endParaRPr lang="en-US"/>
           </a:p>
@@ -1250,7 +1250,7 @@
           <a:p>
             <a:fld id="{2FB4730B-5D83-4DEE-A74C-D6644E055767}" type="datetimeFigureOut">
               <a:rPr lang="en-US" smtClean="0"/>
-              <a:t>9/12/2018</a:t>
+              <a:t>9/14/2018</a:t>
             </a:fld>
             <a:endParaRPr lang="en-US"/>
           </a:p>
@@ -1617,7 +1617,7 @@
           <a:p>
             <a:fld id="{2FB4730B-5D83-4DEE-A74C-D6644E055767}" type="datetimeFigureOut">
               <a:rPr lang="en-US" smtClean="0"/>
-              <a:t>9/12/2018</a:t>
+              <a:t>9/14/2018</a:t>
             </a:fld>
             <a:endParaRPr lang="en-US"/>
           </a:p>
@@ -1735,7 +1735,7 @@
           <a:p>
             <a:fld id="{2FB4730B-5D83-4DEE-A74C-D6644E055767}" type="datetimeFigureOut">
               <a:rPr lang="en-US" smtClean="0"/>
-              <a:t>9/12/2018</a:t>
+              <a:t>9/14/2018</a:t>
             </a:fld>
             <a:endParaRPr lang="en-US"/>
           </a:p>
@@ -1830,7 +1830,7 @@
           <a:p>
             <a:fld id="{2FB4730B-5D83-4DEE-A74C-D6644E055767}" type="datetimeFigureOut">
               <a:rPr lang="en-US" smtClean="0"/>
-              <a:t>9/12/2018</a:t>
+              <a:t>9/14/2018</a:t>
             </a:fld>
             <a:endParaRPr lang="en-US"/>
           </a:p>
@@ -2107,7 +2107,7 @@
           <a:p>
             <a:fld id="{2FB4730B-5D83-4DEE-A74C-D6644E055767}" type="datetimeFigureOut">
               <a:rPr lang="en-US" smtClean="0"/>
-              <a:t>9/12/2018</a:t>
+              <a:t>9/14/2018</a:t>
             </a:fld>
             <a:endParaRPr lang="en-US"/>
           </a:p>
@@ -2360,7 +2360,7 @@
           <a:p>
             <a:fld id="{2FB4730B-5D83-4DEE-A74C-D6644E055767}" type="datetimeFigureOut">
               <a:rPr lang="en-US" smtClean="0"/>
-              <a:t>9/12/2018</a:t>
+              <a:t>9/14/2018</a:t>
             </a:fld>
             <a:endParaRPr lang="en-US"/>
           </a:p>
@@ -2573,7 +2573,7 @@
           <a:p>
             <a:fld id="{2FB4730B-5D83-4DEE-A74C-D6644E055767}" type="datetimeFigureOut">
               <a:rPr lang="en-US" smtClean="0"/>
-              <a:t>9/12/2018</a:t>
+              <a:t>9/14/2018</a:t>
             </a:fld>
             <a:endParaRPr lang="en-US"/>
           </a:p>
@@ -3037,8 +3037,8 @@
         </p:nvSpPr>
         <p:spPr>
           <a:xfrm>
-            <a:off x="602673" y="2031356"/>
-            <a:ext cx="5693956" cy="4207397"/>
+            <a:off x="402044" y="1950333"/>
+            <a:ext cx="6068204" cy="4207397"/>
           </a:xfrm>
         </p:spPr>
         <p:txBody>
@@ -3075,7 +3075,7 @@
                 <a:cs typeface="Times New Roman" panose="02020603050405020304" pitchFamily="18" charset="0"/>
                 <a:hlinkClick r:id="rId3"/>
               </a:rPr>
-              <a:t>github.com/EmoryPython/Lab</a:t>
+              <a:t>github.com/EmoryPython/Bootcamp</a:t>
             </a:r>
             <a:endParaRPr lang="en-US" sz="2400" dirty="0" smtClean="0">
               <a:latin typeface="Times New Roman" panose="02020603050405020304" pitchFamily="18" charset="0"/>
@@ -4007,8 +4007,194 @@
                 <a:latin typeface="Times New Roman" panose="02020603050405020304" pitchFamily="18" charset="0"/>
                 <a:cs typeface="Times New Roman" panose="02020603050405020304" pitchFamily="18" charset="0"/>
               </a:rPr>
-              <a:t> to plot sample data sets – A simple line graph </a:t>
-            </a:r>
+              <a:t> to plot sample data sets – A simple line graph (</a:t>
+            </a:r>
+            <a:r>
+              <a:rPr lang="en-US" sz="2400" dirty="0" smtClean="0">
+                <a:solidFill>
+                  <a:srgbClr val="FF0000"/>
+                </a:solidFill>
+                <a:latin typeface="Times New Roman" panose="02020603050405020304" pitchFamily="18" charset="0"/>
+                <a:cs typeface="Times New Roman" panose="02020603050405020304" pitchFamily="18" charset="0"/>
+              </a:rPr>
+              <a:t>SimplePlot.py</a:t>
+            </a:r>
+            <a:r>
+              <a:rPr lang="en-US" sz="2400" dirty="0" smtClean="0">
+                <a:latin typeface="Times New Roman" panose="02020603050405020304" pitchFamily="18" charset="0"/>
+                <a:cs typeface="Times New Roman" panose="02020603050405020304" pitchFamily="18" charset="0"/>
+              </a:rPr>
+              <a:t>)</a:t>
+            </a:r>
+          </a:p>
+          <a:p>
+            <a:r>
+              <a:rPr lang="en-US" sz="2400" dirty="0">
+                <a:latin typeface="Times New Roman" panose="02020603050405020304" pitchFamily="18" charset="0"/>
+                <a:cs typeface="Times New Roman" panose="02020603050405020304" pitchFamily="18" charset="0"/>
+              </a:rPr>
+              <a:t>Once read in, data can be transformed in multiple ways: </a:t>
+            </a:r>
+            <a:r>
+              <a:rPr lang="en-US" sz="2400" dirty="0" smtClean="0">
+                <a:latin typeface="Times New Roman" panose="02020603050405020304" pitchFamily="18" charset="0"/>
+                <a:cs typeface="Times New Roman" panose="02020603050405020304" pitchFamily="18" charset="0"/>
+              </a:rPr>
+              <a:t>(</a:t>
+            </a:r>
+            <a:r>
+              <a:rPr lang="en-US" sz="2400" dirty="0" smtClean="0">
+                <a:solidFill>
+                  <a:srgbClr val="FF0000"/>
+                </a:solidFill>
+                <a:latin typeface="Times New Roman" panose="02020603050405020304" pitchFamily="18" charset="0"/>
+                <a:cs typeface="Times New Roman" panose="02020603050405020304" pitchFamily="18" charset="0"/>
+              </a:rPr>
+              <a:t>MedDataColumnTransforms.py</a:t>
+            </a:r>
+            <a:r>
+              <a:rPr lang="en-US" sz="2400" dirty="0" smtClean="0">
+                <a:latin typeface="Times New Roman" panose="02020603050405020304" pitchFamily="18" charset="0"/>
+                <a:cs typeface="Times New Roman" panose="02020603050405020304" pitchFamily="18" charset="0"/>
+              </a:rPr>
+              <a:t>)</a:t>
+            </a:r>
+            <a:endParaRPr lang="en-US" sz="2400" dirty="0">
+              <a:latin typeface="Times New Roman" panose="02020603050405020304" pitchFamily="18" charset="0"/>
+              <a:cs typeface="Times New Roman" panose="02020603050405020304" pitchFamily="18" charset="0"/>
+            </a:endParaRPr>
+          </a:p>
+          <a:p>
+            <a:pPr lvl="1"/>
+            <a:r>
+              <a:rPr lang="en-US" sz="2000" dirty="0">
+                <a:latin typeface="Times New Roman" panose="02020603050405020304" pitchFamily="18" charset="0"/>
+                <a:cs typeface="Times New Roman" panose="02020603050405020304" pitchFamily="18" charset="0"/>
+              </a:rPr>
+              <a:t>Mean of columns</a:t>
+            </a:r>
+          </a:p>
+          <a:p>
+            <a:pPr lvl="1"/>
+            <a:r>
+              <a:rPr lang="en-US" sz="2000" dirty="0">
+                <a:latin typeface="Times New Roman" panose="02020603050405020304" pitchFamily="18" charset="0"/>
+                <a:cs typeface="Times New Roman" panose="02020603050405020304" pitchFamily="18" charset="0"/>
+              </a:rPr>
+              <a:t>Group, filter and sort</a:t>
+            </a:r>
+          </a:p>
+          <a:p>
+            <a:pPr lvl="1"/>
+            <a:r>
+              <a:rPr lang="en-US" sz="2000" dirty="0">
+                <a:latin typeface="Times New Roman" panose="02020603050405020304" pitchFamily="18" charset="0"/>
+                <a:cs typeface="Times New Roman" panose="02020603050405020304" pitchFamily="18" charset="0"/>
+              </a:rPr>
+              <a:t>Min, max, median of columns</a:t>
+            </a:r>
+          </a:p>
+          <a:p>
+            <a:r>
+              <a:rPr lang="en-US" sz="2400" dirty="0" smtClean="0">
+                <a:latin typeface="Times New Roman" panose="02020603050405020304" pitchFamily="18" charset="0"/>
+                <a:cs typeface="Times New Roman" panose="02020603050405020304" pitchFamily="18" charset="0"/>
+              </a:rPr>
+              <a:t> The transformed data can be plotted – (</a:t>
+            </a:r>
+            <a:r>
+              <a:rPr lang="en-US" sz="2400" dirty="0" smtClean="0">
+                <a:solidFill>
+                  <a:srgbClr val="FF0000"/>
+                </a:solidFill>
+                <a:latin typeface="Times New Roman" panose="02020603050405020304" pitchFamily="18" charset="0"/>
+                <a:cs typeface="Times New Roman" panose="02020603050405020304" pitchFamily="18" charset="0"/>
+              </a:rPr>
+              <a:t>MedDataPlotGrouping.py</a:t>
+            </a:r>
+            <a:r>
+              <a:rPr lang="en-US" sz="2400" dirty="0" smtClean="0">
+                <a:latin typeface="Times New Roman" panose="02020603050405020304" pitchFamily="18" charset="0"/>
+                <a:cs typeface="Times New Roman" panose="02020603050405020304" pitchFamily="18" charset="0"/>
+              </a:rPr>
+              <a:t>)</a:t>
+            </a:r>
+          </a:p>
+          <a:p>
+            <a:pPr lvl="1"/>
+            <a:r>
+              <a:rPr lang="en-US" sz="2000" dirty="0" smtClean="0">
+                <a:latin typeface="Times New Roman" panose="02020603050405020304" pitchFamily="18" charset="0"/>
+                <a:cs typeface="Times New Roman" panose="02020603050405020304" pitchFamily="18" charset="0"/>
+              </a:rPr>
+              <a:t>As a bar graph or any other plot that fits the data representation needs</a:t>
+            </a:r>
+          </a:p>
+          <a:p>
+            <a:pPr lvl="1"/>
+            <a:r>
+              <a:rPr lang="en-US" sz="2000" dirty="0" smtClean="0">
+                <a:latin typeface="Times New Roman" panose="02020603050405020304" pitchFamily="18" charset="0"/>
+                <a:cs typeface="Times New Roman" panose="02020603050405020304" pitchFamily="18" charset="0"/>
+              </a:rPr>
+              <a:t>Alternately, binned data can be plotted as a histogram </a:t>
+            </a:r>
+            <a:r>
+              <a:rPr lang="en-US" sz="2000" dirty="0">
+                <a:latin typeface="Times New Roman" panose="02020603050405020304" pitchFamily="18" charset="0"/>
+                <a:cs typeface="Times New Roman" panose="02020603050405020304" pitchFamily="18" charset="0"/>
+              </a:rPr>
+              <a:t>– </a:t>
+            </a:r>
+            <a:r>
+              <a:rPr lang="en-US" sz="2000">
+                <a:latin typeface="Times New Roman" panose="02020603050405020304" pitchFamily="18" charset="0"/>
+                <a:cs typeface="Times New Roman" panose="02020603050405020304" pitchFamily="18" charset="0"/>
+              </a:rPr>
+              <a:t>(</a:t>
+            </a:r>
+            <a:r>
+              <a:rPr lang="en-US" sz="2000" smtClean="0">
+                <a:solidFill>
+                  <a:srgbClr val="FF0000"/>
+                </a:solidFill>
+                <a:latin typeface="Times New Roman" panose="02020603050405020304" pitchFamily="18" charset="0"/>
+                <a:cs typeface="Times New Roman" panose="02020603050405020304" pitchFamily="18" charset="0"/>
+              </a:rPr>
+              <a:t>MedDataPlotHistogram.py</a:t>
+            </a:r>
+            <a:r>
+              <a:rPr lang="en-US" sz="2000" dirty="0">
+                <a:latin typeface="Times New Roman" panose="02020603050405020304" pitchFamily="18" charset="0"/>
+                <a:cs typeface="Times New Roman" panose="02020603050405020304" pitchFamily="18" charset="0"/>
+              </a:rPr>
+              <a:t>)</a:t>
+            </a:r>
+          </a:p>
+          <a:p>
+            <a:pPr marL="457200" lvl="1" indent="0">
+              <a:buNone/>
+            </a:pPr>
+            <a:endParaRPr lang="en-US" sz="2000" dirty="0" smtClean="0">
+              <a:latin typeface="Times New Roman" panose="02020603050405020304" pitchFamily="18" charset="0"/>
+              <a:cs typeface="Times New Roman" panose="02020603050405020304" pitchFamily="18" charset="0"/>
+            </a:endParaRPr>
+          </a:p>
+          <a:p>
+            <a:pPr lvl="1"/>
+            <a:endParaRPr lang="en-US" sz="2000" dirty="0" smtClean="0">
+              <a:latin typeface="Times New Roman" panose="02020603050405020304" pitchFamily="18" charset="0"/>
+              <a:cs typeface="Times New Roman" panose="02020603050405020304" pitchFamily="18" charset="0"/>
+            </a:endParaRPr>
+          </a:p>
+          <a:p>
+            <a:pPr marL="0" indent="0">
+              <a:buNone/>
+            </a:pPr>
+            <a:endParaRPr lang="en-US" sz="2400" dirty="0" smtClean="0">
+              <a:latin typeface="Times New Roman" panose="02020603050405020304" pitchFamily="18" charset="0"/>
+              <a:cs typeface="Times New Roman" panose="02020603050405020304" pitchFamily="18" charset="0"/>
+            </a:endParaRPr>
           </a:p>
           <a:p>
             <a:pPr marL="0" indent="0">
@@ -4021,54 +4207,6 @@
           </a:p>
         </p:txBody>
       </p:sp>
-      <p:pic>
-        <p:nvPicPr>
-          <p:cNvPr id="5" name="Picture 4"/>
-          <p:cNvPicPr>
-            <a:picLocks noChangeAspect="1"/>
-          </p:cNvPicPr>
-          <p:nvPr/>
-        </p:nvPicPr>
-        <p:blipFill>
-          <a:blip r:embed="rId2"/>
-          <a:stretch>
-            <a:fillRect/>
-          </a:stretch>
-        </p:blipFill>
-        <p:spPr>
-          <a:xfrm>
-            <a:off x="7007716" y="2722910"/>
-            <a:ext cx="4218097" cy="3623766"/>
-          </a:xfrm>
-          <a:prstGeom prst="rect">
-            <a:avLst/>
-          </a:prstGeom>
-        </p:spPr>
-      </p:pic>
-      <p:pic>
-        <p:nvPicPr>
-          <p:cNvPr id="6" name="Picture 5"/>
-          <p:cNvPicPr>
-            <a:picLocks noChangeAspect="1"/>
-          </p:cNvPicPr>
-          <p:nvPr/>
-        </p:nvPicPr>
-        <p:blipFill>
-          <a:blip r:embed="rId3"/>
-          <a:stretch>
-            <a:fillRect/>
-          </a:stretch>
-        </p:blipFill>
-        <p:spPr>
-          <a:xfrm>
-            <a:off x="958788" y="2357097"/>
-            <a:ext cx="5928340" cy="4159291"/>
-          </a:xfrm>
-          <a:prstGeom prst="rect">
-            <a:avLst/>
-          </a:prstGeom>
-        </p:spPr>
-      </p:pic>
     </p:spTree>
     <p:extLst>
       <p:ext uri="{BB962C8B-B14F-4D97-AF65-F5344CB8AC3E}">

</xml_diff>